<commit_message>
Add DXUT & ASSIMP(1).pptx Add How to create new project Add How to change GameIcon
</commit_message>
<xml_diff>
--- a/Document/DXUT & ASSIMP(1).pptx
+++ b/Document/DXUT & ASSIMP(1).pptx
@@ -124,6 +124,11 @@
       </a:defRPr>
     </a:lvl9pPr>
   </p:defaultTextStyle>
+  <p:extLst>
+    <p:ext uri="{EFAFB233-063F-42B5-8137-9DF3F51BA10A}">
+      <p15:sldGuideLst xmlns:p15="http://schemas.microsoft.com/office/powerpoint/2012/main"/>
+    </p:ext>
+  </p:extLst>
 </p:presentation>
 </file>
 
@@ -258,7 +263,7 @@
           <a:p>
             <a:fld id="{6C7F92A7-3622-4605-81CA-A59419B37ED7}" type="datetimeFigureOut">
               <a:rPr lang="ko-KR" altLang="en-US" smtClean="0"/>
-              <a:t>2015-08-07</a:t>
+              <a:t>2015-08-08</a:t>
             </a:fld>
             <a:endParaRPr lang="ko-KR" altLang="en-US"/>
           </a:p>
@@ -2579,7 +2584,7 @@
           <a:p>
             <a:fld id="{6C7F92A7-3622-4605-81CA-A59419B37ED7}" type="datetimeFigureOut">
               <a:rPr lang="ko-KR" altLang="en-US" smtClean="0"/>
-              <a:t>2015-08-07</a:t>
+              <a:t>2015-08-08</a:t>
             </a:fld>
             <a:endParaRPr lang="ko-KR" altLang="en-US"/>
           </a:p>
@@ -5637,15 +5642,7 @@
             </a:r>
           </a:p>
           <a:p>
-            <a:r>
-              <a:rPr lang="ko-KR" altLang="en-US" dirty="0" smtClean="0"/>
-              <a:t>카메라 추가와 매시 추가</a:t>
-            </a:r>
-            <a:r>
-              <a:rPr lang="en-US" altLang="ko-KR" smtClean="0"/>
-              <a:t>.</a:t>
-            </a:r>
-            <a:endParaRPr lang="ko-KR" altLang="en-US"/>
+            <a:endParaRPr lang="ko-KR" altLang="en-US" dirty="0"/>
           </a:p>
         </p:txBody>
       </p:sp>

</xml_diff>